<commit_message>
Narated some claims videos
</commit_message>
<xml_diff>
--- a/PowerPoints/Phase 3 - Claims Terminology/011 Re-Adjudicating Claims.pptx
+++ b/PowerPoints/Phase 3 - Claims Terminology/011 Re-Adjudicating Claims.pptx
@@ -107,6 +107,22 @@
       </a:defRPr>
     </a:lvl9pPr>
   </p:defaultTextStyle>
+  <p:extLst>
+    <p:ext uri="{EFAFB233-063F-42B5-8137-9DF3F51BA10A}">
+      <p15:sldGuideLst xmlns:p15="http://schemas.microsoft.com/office/powerpoint/2012/main">
+        <p15:guide id="1" orient="horz" pos="2160">
+          <p15:clr>
+            <a:srgbClr val="A4A3A4"/>
+          </p15:clr>
+        </p15:guide>
+        <p15:guide id="2" pos="3840">
+          <p15:clr>
+            <a:srgbClr val="A4A3A4"/>
+          </p15:clr>
+        </p15:guide>
+      </p15:sldGuideLst>
+    </p:ext>
+  </p:extLst>
 </p:presentation>
 </file>
 
@@ -154,7 +170,7 @@
           </a:lstStyle>
           <a:p>
             <a:r>
-              <a:rPr lang="en-US" smtClean="0"/>
+              <a:rPr lang="en-US"/>
               <a:t>Click to edit Master title style</a:t>
             </a:r>
             <a:endParaRPr lang="en-US" dirty="0"/>
@@ -228,7 +244,7 @@
           </a:lstStyle>
           <a:p>
             <a:r>
-              <a:rPr lang="en-US" smtClean="0"/>
+              <a:rPr lang="en-US"/>
               <a:t>Click to edit Master subtitle style</a:t>
             </a:r>
             <a:endParaRPr lang="en-US" dirty="0"/>
@@ -252,7 +268,7 @@
           <a:p>
             <a:fld id="{FF632088-7E42-4B13-8645-6CA4616862AF}" type="datetimeFigureOut">
               <a:rPr lang="en-US" smtClean="0"/>
-              <a:t>3/3/2016</a:t>
+              <a:t>3/5/2016</a:t>
             </a:fld>
             <a:endParaRPr lang="en-US"/>
           </a:p>
@@ -346,10 +362,9 @@
           <a:lstStyle/>
           <a:p>
             <a:r>
-              <a:rPr lang="en-US" smtClean="0"/>
+              <a:rPr lang="en-US"/>
               <a:t>Click to edit Master title style</a:t>
             </a:r>
-            <a:endParaRPr lang="en-US"/>
           </a:p>
         </p:txBody>
       </p:sp>
@@ -370,35 +385,35 @@
           <a:p>
             <a:pPr lvl="0"/>
             <a:r>
-              <a:rPr lang="en-US" smtClean="0"/>
+              <a:rPr lang="en-US"/>
               <a:t>Edit Master text styles</a:t>
             </a:r>
           </a:p>
           <a:p>
             <a:pPr lvl="1"/>
             <a:r>
-              <a:rPr lang="en-US" smtClean="0"/>
+              <a:rPr lang="en-US"/>
               <a:t>Second level</a:t>
             </a:r>
           </a:p>
           <a:p>
             <a:pPr lvl="2"/>
             <a:r>
-              <a:rPr lang="en-US" smtClean="0"/>
+              <a:rPr lang="en-US"/>
               <a:t>Third level</a:t>
             </a:r>
           </a:p>
           <a:p>
             <a:pPr lvl="3"/>
             <a:r>
-              <a:rPr lang="en-US" smtClean="0"/>
+              <a:rPr lang="en-US"/>
               <a:t>Fourth level</a:t>
             </a:r>
           </a:p>
           <a:p>
             <a:pPr lvl="4"/>
             <a:r>
-              <a:rPr lang="en-US" smtClean="0"/>
+              <a:rPr lang="en-US"/>
               <a:t>Fifth level</a:t>
             </a:r>
             <a:endParaRPr lang="en-US" dirty="0"/>
@@ -422,7 +437,7 @@
           <a:p>
             <a:fld id="{FF632088-7E42-4B13-8645-6CA4616862AF}" type="datetimeFigureOut">
               <a:rPr lang="en-US" smtClean="0"/>
-              <a:t>3/3/2016</a:t>
+              <a:t>3/5/2016</a:t>
             </a:fld>
             <a:endParaRPr lang="en-US"/>
           </a:p>
@@ -521,10 +536,9 @@
           <a:lstStyle/>
           <a:p>
             <a:r>
-              <a:rPr lang="en-US" smtClean="0"/>
+              <a:rPr lang="en-US"/>
               <a:t>Click to edit Master title style</a:t>
             </a:r>
-            <a:endParaRPr lang="en-US"/>
           </a:p>
         </p:txBody>
       </p:sp>
@@ -550,38 +564,37 @@
           <a:p>
             <a:pPr lvl="0"/>
             <a:r>
-              <a:rPr lang="en-US" smtClean="0"/>
+              <a:rPr lang="en-US"/>
               <a:t>Edit Master text styles</a:t>
             </a:r>
           </a:p>
           <a:p>
             <a:pPr lvl="1"/>
             <a:r>
-              <a:rPr lang="en-US" smtClean="0"/>
+              <a:rPr lang="en-US"/>
               <a:t>Second level</a:t>
             </a:r>
           </a:p>
           <a:p>
             <a:pPr lvl="2"/>
             <a:r>
-              <a:rPr lang="en-US" smtClean="0"/>
+              <a:rPr lang="en-US"/>
               <a:t>Third level</a:t>
             </a:r>
           </a:p>
           <a:p>
             <a:pPr lvl="3"/>
             <a:r>
-              <a:rPr lang="en-US" smtClean="0"/>
+              <a:rPr lang="en-US"/>
               <a:t>Fourth level</a:t>
             </a:r>
           </a:p>
           <a:p>
             <a:pPr lvl="4"/>
             <a:r>
-              <a:rPr lang="en-US" smtClean="0"/>
+              <a:rPr lang="en-US"/>
               <a:t>Fifth level</a:t>
             </a:r>
-            <a:endParaRPr lang="en-US"/>
           </a:p>
         </p:txBody>
       </p:sp>
@@ -602,7 +615,7 @@
           <a:p>
             <a:fld id="{FF632088-7E42-4B13-8645-6CA4616862AF}" type="datetimeFigureOut">
               <a:rPr lang="en-US" smtClean="0"/>
-              <a:t>3/3/2016</a:t>
+              <a:t>3/5/2016</a:t>
             </a:fld>
             <a:endParaRPr lang="en-US"/>
           </a:p>
@@ -707,7 +720,7 @@
           </a:lstStyle>
           <a:p>
             <a:r>
-              <a:rPr lang="en-US" smtClean="0"/>
+              <a:rPr lang="en-US"/>
               <a:t>Click to edit Master title style</a:t>
             </a:r>
             <a:endParaRPr lang="en-US" dirty="0"/>
@@ -778,7 +791,7 @@
           </a:lstStyle>
           <a:p>
             <a:r>
-              <a:rPr lang="en-US" smtClean="0"/>
+              <a:rPr lang="en-US"/>
               <a:t>Click to edit Master subtitle style</a:t>
             </a:r>
             <a:endParaRPr lang="en-US" dirty="0"/>
@@ -802,7 +815,7 @@
           <a:p>
             <a:fld id="{FF632088-7E42-4B13-8645-6CA4616862AF}" type="datetimeFigureOut">
               <a:rPr lang="en-US" smtClean="0"/>
-              <a:t>3/3/2016</a:t>
+              <a:t>3/5/2016</a:t>
             </a:fld>
             <a:endParaRPr lang="en-US"/>
           </a:p>
@@ -943,7 +956,7 @@
           <a:lstStyle/>
           <a:p>
             <a:r>
-              <a:rPr lang="en-US" smtClean="0"/>
+              <a:rPr lang="en-US"/>
               <a:t>Click to edit Master title style</a:t>
             </a:r>
             <a:endParaRPr lang="en-US" dirty="0"/>
@@ -967,35 +980,35 @@
           <a:p>
             <a:pPr lvl="0"/>
             <a:r>
-              <a:rPr lang="en-US" smtClean="0"/>
+              <a:rPr lang="en-US"/>
               <a:t>Edit Master text styles</a:t>
             </a:r>
           </a:p>
           <a:p>
             <a:pPr lvl="1"/>
             <a:r>
-              <a:rPr lang="en-US" smtClean="0"/>
+              <a:rPr lang="en-US"/>
               <a:t>Second level</a:t>
             </a:r>
           </a:p>
           <a:p>
             <a:pPr lvl="2"/>
             <a:r>
-              <a:rPr lang="en-US" smtClean="0"/>
+              <a:rPr lang="en-US"/>
               <a:t>Third level</a:t>
             </a:r>
           </a:p>
           <a:p>
             <a:pPr lvl="3"/>
             <a:r>
-              <a:rPr lang="en-US" smtClean="0"/>
+              <a:rPr lang="en-US"/>
               <a:t>Fourth level</a:t>
             </a:r>
           </a:p>
           <a:p>
             <a:pPr lvl="4"/>
             <a:r>
-              <a:rPr lang="en-US" smtClean="0"/>
+              <a:rPr lang="en-US"/>
               <a:t>Fifth level</a:t>
             </a:r>
             <a:endParaRPr lang="en-US" dirty="0"/>
@@ -1019,7 +1032,7 @@
           <a:p>
             <a:fld id="{FF632088-7E42-4B13-8645-6CA4616862AF}" type="datetimeFigureOut">
               <a:rPr lang="en-US" smtClean="0"/>
-              <a:t>3/3/2016</a:t>
+              <a:t>3/5/2016</a:t>
             </a:fld>
             <a:endParaRPr lang="en-US"/>
           </a:p>
@@ -1161,7 +1174,7 @@
           </a:lstStyle>
           <a:p>
             <a:r>
-              <a:rPr lang="en-US" smtClean="0"/>
+              <a:rPr lang="en-US"/>
               <a:t>Click to edit Master title style</a:t>
             </a:r>
             <a:endParaRPr lang="en-US" dirty="0"/>
@@ -1281,7 +1294,7 @@
           <a:p>
             <a:pPr lvl="0"/>
             <a:r>
-              <a:rPr lang="en-US" smtClean="0"/>
+              <a:rPr lang="en-US"/>
               <a:t>Edit Master text styles</a:t>
             </a:r>
           </a:p>
@@ -1304,7 +1317,7 @@
           <a:p>
             <a:fld id="{FF632088-7E42-4B13-8645-6CA4616862AF}" type="datetimeFigureOut">
               <a:rPr lang="en-US" smtClean="0"/>
-              <a:t>3/3/2016</a:t>
+              <a:t>3/5/2016</a:t>
             </a:fld>
             <a:endParaRPr lang="en-US"/>
           </a:p>
@@ -1440,7 +1453,7 @@
           <a:lstStyle/>
           <a:p>
             <a:r>
-              <a:rPr lang="en-US" smtClean="0"/>
+              <a:rPr lang="en-US"/>
               <a:t>Click to edit Master title style</a:t>
             </a:r>
             <a:endParaRPr lang="en-US" dirty="0"/>
@@ -1469,35 +1482,35 @@
           <a:p>
             <a:pPr lvl="0"/>
             <a:r>
-              <a:rPr lang="en-US" smtClean="0"/>
+              <a:rPr lang="en-US"/>
               <a:t>Edit Master text styles</a:t>
             </a:r>
           </a:p>
           <a:p>
             <a:pPr lvl="1"/>
             <a:r>
-              <a:rPr lang="en-US" smtClean="0"/>
+              <a:rPr lang="en-US"/>
               <a:t>Second level</a:t>
             </a:r>
           </a:p>
           <a:p>
             <a:pPr lvl="2"/>
             <a:r>
-              <a:rPr lang="en-US" smtClean="0"/>
+              <a:rPr lang="en-US"/>
               <a:t>Third level</a:t>
             </a:r>
           </a:p>
           <a:p>
             <a:pPr lvl="3"/>
             <a:r>
-              <a:rPr lang="en-US" smtClean="0"/>
+              <a:rPr lang="en-US"/>
               <a:t>Fourth level</a:t>
             </a:r>
           </a:p>
           <a:p>
             <a:pPr lvl="4"/>
             <a:r>
-              <a:rPr lang="en-US" smtClean="0"/>
+              <a:rPr lang="en-US"/>
               <a:t>Fifth level</a:t>
             </a:r>
             <a:endParaRPr lang="en-US" dirty="0"/>
@@ -1526,35 +1539,35 @@
           <a:p>
             <a:pPr lvl="0"/>
             <a:r>
-              <a:rPr lang="en-US" smtClean="0"/>
+              <a:rPr lang="en-US"/>
               <a:t>Edit Master text styles</a:t>
             </a:r>
           </a:p>
           <a:p>
             <a:pPr lvl="1"/>
             <a:r>
-              <a:rPr lang="en-US" smtClean="0"/>
+              <a:rPr lang="en-US"/>
               <a:t>Second level</a:t>
             </a:r>
           </a:p>
           <a:p>
             <a:pPr lvl="2"/>
             <a:r>
-              <a:rPr lang="en-US" smtClean="0"/>
+              <a:rPr lang="en-US"/>
               <a:t>Third level</a:t>
             </a:r>
           </a:p>
           <a:p>
             <a:pPr lvl="3"/>
             <a:r>
-              <a:rPr lang="en-US" smtClean="0"/>
+              <a:rPr lang="en-US"/>
               <a:t>Fourth level</a:t>
             </a:r>
           </a:p>
           <a:p>
             <a:pPr lvl="4"/>
             <a:r>
-              <a:rPr lang="en-US" smtClean="0"/>
+              <a:rPr lang="en-US"/>
               <a:t>Fifth level</a:t>
             </a:r>
             <a:endParaRPr lang="en-US" dirty="0"/>
@@ -1578,7 +1591,7 @@
           <a:p>
             <a:fld id="{FF632088-7E42-4B13-8645-6CA4616862AF}" type="datetimeFigureOut">
               <a:rPr lang="en-US" smtClean="0"/>
-              <a:t>3/3/2016</a:t>
+              <a:t>3/5/2016</a:t>
             </a:fld>
             <a:endParaRPr lang="en-US"/>
           </a:p>
@@ -1675,7 +1688,7 @@
   </p:clrMapOvr>
   <p:extLst>
     <p:ext uri="{DCECCB84-F9BA-43D5-87BE-67443E8EF086}">
-      <p15:sldGuideLst xmlns:p15="http://schemas.microsoft.com/office/powerpoint/2012/main" xmlns=""/>
+      <p15:sldGuideLst xmlns:p15="http://schemas.microsoft.com/office/powerpoint/2012/main"/>
     </p:ext>
   </p:extLst>
 </p:sldLayout>
@@ -1719,7 +1732,7 @@
           <a:lstStyle/>
           <a:p>
             <a:r>
-              <a:rPr lang="en-US" smtClean="0"/>
+              <a:rPr lang="en-US"/>
               <a:t>Click to edit Master title style</a:t>
             </a:r>
             <a:endParaRPr lang="en-US" dirty="0"/>
@@ -1794,7 +1807,7 @@
           <a:p>
             <a:pPr lvl="0"/>
             <a:r>
-              <a:rPr lang="en-US" smtClean="0"/>
+              <a:rPr lang="en-US"/>
               <a:t>Edit Master text styles</a:t>
             </a:r>
           </a:p>
@@ -1822,35 +1835,35 @@
           <a:p>
             <a:pPr lvl="0"/>
             <a:r>
-              <a:rPr lang="en-US" smtClean="0"/>
+              <a:rPr lang="en-US"/>
               <a:t>Edit Master text styles</a:t>
             </a:r>
           </a:p>
           <a:p>
             <a:pPr lvl="1"/>
             <a:r>
-              <a:rPr lang="en-US" smtClean="0"/>
+              <a:rPr lang="en-US"/>
               <a:t>Second level</a:t>
             </a:r>
           </a:p>
           <a:p>
             <a:pPr lvl="2"/>
             <a:r>
-              <a:rPr lang="en-US" smtClean="0"/>
+              <a:rPr lang="en-US"/>
               <a:t>Third level</a:t>
             </a:r>
           </a:p>
           <a:p>
             <a:pPr lvl="3"/>
             <a:r>
-              <a:rPr lang="en-US" smtClean="0"/>
+              <a:rPr lang="en-US"/>
               <a:t>Fourth level</a:t>
             </a:r>
           </a:p>
           <a:p>
             <a:pPr lvl="4"/>
             <a:r>
-              <a:rPr lang="en-US" smtClean="0"/>
+              <a:rPr lang="en-US"/>
               <a:t>Fifth level</a:t>
             </a:r>
             <a:endParaRPr lang="en-US" dirty="0"/>
@@ -1925,7 +1938,7 @@
           <a:p>
             <a:pPr lvl="0"/>
             <a:r>
-              <a:rPr lang="en-US" smtClean="0"/>
+              <a:rPr lang="en-US"/>
               <a:t>Edit Master text styles</a:t>
             </a:r>
           </a:p>
@@ -1953,35 +1966,35 @@
           <a:p>
             <a:pPr lvl="0"/>
             <a:r>
-              <a:rPr lang="en-US" smtClean="0"/>
+              <a:rPr lang="en-US"/>
               <a:t>Edit Master text styles</a:t>
             </a:r>
           </a:p>
           <a:p>
             <a:pPr lvl="1"/>
             <a:r>
-              <a:rPr lang="en-US" smtClean="0"/>
+              <a:rPr lang="en-US"/>
               <a:t>Second level</a:t>
             </a:r>
           </a:p>
           <a:p>
             <a:pPr lvl="2"/>
             <a:r>
-              <a:rPr lang="en-US" smtClean="0"/>
+              <a:rPr lang="en-US"/>
               <a:t>Third level</a:t>
             </a:r>
           </a:p>
           <a:p>
             <a:pPr lvl="3"/>
             <a:r>
-              <a:rPr lang="en-US" smtClean="0"/>
+              <a:rPr lang="en-US"/>
               <a:t>Fourth level</a:t>
             </a:r>
           </a:p>
           <a:p>
             <a:pPr lvl="4"/>
             <a:r>
-              <a:rPr lang="en-US" smtClean="0"/>
+              <a:rPr lang="en-US"/>
               <a:t>Fifth level</a:t>
             </a:r>
             <a:endParaRPr lang="en-US" dirty="0"/>
@@ -2005,7 +2018,7 @@
           <a:p>
             <a:fld id="{FF632088-7E42-4B13-8645-6CA4616862AF}" type="datetimeFigureOut">
               <a:rPr lang="en-US" smtClean="0"/>
-              <a:t>3/3/2016</a:t>
+              <a:t>3/5/2016</a:t>
             </a:fld>
             <a:endParaRPr lang="en-US"/>
           </a:p>
@@ -2102,7 +2115,7 @@
   </p:clrMapOvr>
   <p:extLst>
     <p:ext uri="{DCECCB84-F9BA-43D5-87BE-67443E8EF086}">
-      <p15:sldGuideLst xmlns:p15="http://schemas.microsoft.com/office/powerpoint/2012/main" xmlns=""/>
+      <p15:sldGuideLst xmlns:p15="http://schemas.microsoft.com/office/powerpoint/2012/main"/>
     </p:ext>
   </p:extLst>
 </p:sldLayout>
@@ -2141,7 +2154,7 @@
           <a:lstStyle/>
           <a:p>
             <a:r>
-              <a:rPr lang="en-US" smtClean="0"/>
+              <a:rPr lang="en-US"/>
               <a:t>Click to edit Master title style</a:t>
             </a:r>
             <a:endParaRPr lang="en-US" dirty="0"/>
@@ -2165,7 +2178,7 @@
           <a:p>
             <a:fld id="{FF632088-7E42-4B13-8645-6CA4616862AF}" type="datetimeFigureOut">
               <a:rPr lang="en-US" smtClean="0"/>
-              <a:t>3/3/2016</a:t>
+              <a:t>3/5/2016</a:t>
             </a:fld>
             <a:endParaRPr lang="en-US"/>
           </a:p>
@@ -2297,7 +2310,7 @@
           <a:p>
             <a:fld id="{FF632088-7E42-4B13-8645-6CA4616862AF}" type="datetimeFigureOut">
               <a:rPr lang="en-US" smtClean="0"/>
-              <a:t>3/3/2016</a:t>
+              <a:t>3/5/2016</a:t>
             </a:fld>
             <a:endParaRPr lang="en-US"/>
           </a:p>
@@ -2402,7 +2415,7 @@
           </a:lstStyle>
           <a:p>
             <a:r>
-              <a:rPr lang="en-US" smtClean="0"/>
+              <a:rPr lang="en-US"/>
               <a:t>Click to edit Master title style</a:t>
             </a:r>
             <a:endParaRPr lang="en-US" dirty="0"/>
@@ -2431,35 +2444,35 @@
           <a:p>
             <a:pPr lvl="0"/>
             <a:r>
-              <a:rPr lang="en-US" smtClean="0"/>
+              <a:rPr lang="en-US"/>
               <a:t>Edit Master text styles</a:t>
             </a:r>
           </a:p>
           <a:p>
             <a:pPr lvl="1"/>
             <a:r>
-              <a:rPr lang="en-US" smtClean="0"/>
+              <a:rPr lang="en-US"/>
               <a:t>Second level</a:t>
             </a:r>
           </a:p>
           <a:p>
             <a:pPr lvl="2"/>
             <a:r>
-              <a:rPr lang="en-US" smtClean="0"/>
+              <a:rPr lang="en-US"/>
               <a:t>Third level</a:t>
             </a:r>
           </a:p>
           <a:p>
             <a:pPr lvl="3"/>
             <a:r>
-              <a:rPr lang="en-US" smtClean="0"/>
+              <a:rPr lang="en-US"/>
               <a:t>Fourth level</a:t>
             </a:r>
           </a:p>
           <a:p>
             <a:pPr lvl="4"/>
             <a:r>
-              <a:rPr lang="en-US" smtClean="0"/>
+              <a:rPr lang="en-US"/>
               <a:t>Fifth level</a:t>
             </a:r>
             <a:endParaRPr lang="en-US" dirty="0"/>
@@ -2525,7 +2538,7 @@
           <a:p>
             <a:pPr lvl="0"/>
             <a:r>
-              <a:rPr lang="en-US" smtClean="0"/>
+              <a:rPr lang="en-US"/>
               <a:t>Edit Master text styles</a:t>
             </a:r>
           </a:p>
@@ -2548,7 +2561,7 @@
           <a:p>
             <a:fld id="{FF632088-7E42-4B13-8645-6CA4616862AF}" type="datetimeFigureOut">
               <a:rPr lang="en-US" smtClean="0"/>
-              <a:t>3/3/2016</a:t>
+              <a:t>3/5/2016</a:t>
             </a:fld>
             <a:endParaRPr lang="en-US"/>
           </a:p>
@@ -2645,7 +2658,7 @@
   </p:clrMapOvr>
   <p:extLst>
     <p:ext uri="{DCECCB84-F9BA-43D5-87BE-67443E8EF086}">
-      <p15:sldGuideLst xmlns:p15="http://schemas.microsoft.com/office/powerpoint/2012/main" xmlns=""/>
+      <p15:sldGuideLst xmlns:p15="http://schemas.microsoft.com/office/powerpoint/2012/main"/>
     </p:ext>
   </p:extLst>
 </p:sldLayout>
@@ -2684,7 +2697,7 @@
           <a:lstStyle/>
           <a:p>
             <a:r>
-              <a:rPr lang="en-US" smtClean="0"/>
+              <a:rPr lang="en-US"/>
               <a:t>Click to edit Master title style</a:t>
             </a:r>
             <a:endParaRPr lang="en-US" dirty="0"/>
@@ -2708,35 +2721,35 @@
           <a:p>
             <a:pPr lvl="0"/>
             <a:r>
-              <a:rPr lang="en-US" smtClean="0"/>
+              <a:rPr lang="en-US"/>
               <a:t>Edit Master text styles</a:t>
             </a:r>
           </a:p>
           <a:p>
             <a:pPr lvl="1"/>
             <a:r>
-              <a:rPr lang="en-US" smtClean="0"/>
+              <a:rPr lang="en-US"/>
               <a:t>Second level</a:t>
             </a:r>
           </a:p>
           <a:p>
             <a:pPr lvl="2"/>
             <a:r>
-              <a:rPr lang="en-US" smtClean="0"/>
+              <a:rPr lang="en-US"/>
               <a:t>Third level</a:t>
             </a:r>
           </a:p>
           <a:p>
             <a:pPr lvl="3"/>
             <a:r>
-              <a:rPr lang="en-US" smtClean="0"/>
+              <a:rPr lang="en-US"/>
               <a:t>Fourth level</a:t>
             </a:r>
           </a:p>
           <a:p>
             <a:pPr lvl="4"/>
             <a:r>
-              <a:rPr lang="en-US" smtClean="0"/>
+              <a:rPr lang="en-US"/>
               <a:t>Fifth level</a:t>
             </a:r>
             <a:endParaRPr lang="en-US" dirty="0"/>
@@ -2760,7 +2773,7 @@
           <a:p>
             <a:fld id="{FF632088-7E42-4B13-8645-6CA4616862AF}" type="datetimeFigureOut">
               <a:rPr lang="en-US" smtClean="0"/>
-              <a:t>3/3/2016</a:t>
+              <a:t>3/5/2016</a:t>
             </a:fld>
             <a:endParaRPr lang="en-US"/>
           </a:p>
@@ -3003,7 +3016,7 @@
           </a:lstStyle>
           <a:p>
             <a:r>
-              <a:rPr lang="en-US" smtClean="0"/>
+              <a:rPr lang="en-US"/>
               <a:t>Click to edit Master title style</a:t>
             </a:r>
             <a:endParaRPr lang="en-US" dirty="0"/>
@@ -3078,7 +3091,7 @@
           </a:lstStyle>
           <a:p>
             <a:r>
-              <a:rPr lang="en-US" smtClean="0"/>
+              <a:rPr lang="en-US"/>
               <a:t>Click icon to add picture</a:t>
             </a:r>
             <a:endParaRPr lang="en-US" dirty="0"/>
@@ -3146,7 +3159,7 @@
           <a:p>
             <a:pPr lvl="0"/>
             <a:r>
-              <a:rPr lang="en-US" smtClean="0"/>
+              <a:rPr lang="en-US"/>
               <a:t>Edit Master text styles</a:t>
             </a:r>
           </a:p>
@@ -3178,7 +3191,7 @@
           <a:p>
             <a:fld id="{FF632088-7E42-4B13-8645-6CA4616862AF}" type="datetimeFigureOut">
               <a:rPr lang="en-US" smtClean="0"/>
-              <a:t>3/3/2016</a:t>
+              <a:t>3/5/2016</a:t>
             </a:fld>
             <a:endParaRPr lang="en-US"/>
           </a:p>
@@ -3314,7 +3327,7 @@
           <a:lstStyle/>
           <a:p>
             <a:r>
-              <a:rPr lang="en-US" smtClean="0"/>
+              <a:rPr lang="en-US"/>
               <a:t>Click to edit Master title style</a:t>
             </a:r>
             <a:endParaRPr lang="en-US" dirty="0"/>
@@ -3338,35 +3351,35 @@
           <a:p>
             <a:pPr lvl="0"/>
             <a:r>
-              <a:rPr lang="en-US" smtClean="0"/>
+              <a:rPr lang="en-US"/>
               <a:t>Edit Master text styles</a:t>
             </a:r>
           </a:p>
           <a:p>
             <a:pPr lvl="1"/>
             <a:r>
-              <a:rPr lang="en-US" smtClean="0"/>
+              <a:rPr lang="en-US"/>
               <a:t>Second level</a:t>
             </a:r>
           </a:p>
           <a:p>
             <a:pPr lvl="2"/>
             <a:r>
-              <a:rPr lang="en-US" smtClean="0"/>
+              <a:rPr lang="en-US"/>
               <a:t>Third level</a:t>
             </a:r>
           </a:p>
           <a:p>
             <a:pPr lvl="3"/>
             <a:r>
-              <a:rPr lang="en-US" smtClean="0"/>
+              <a:rPr lang="en-US"/>
               <a:t>Fourth level</a:t>
             </a:r>
           </a:p>
           <a:p>
             <a:pPr lvl="4"/>
             <a:r>
-              <a:rPr lang="en-US" smtClean="0"/>
+              <a:rPr lang="en-US"/>
               <a:t>Fifth level</a:t>
             </a:r>
             <a:endParaRPr lang="en-US" dirty="0"/>
@@ -3390,7 +3403,7 @@
           <a:p>
             <a:fld id="{FF632088-7E42-4B13-8645-6CA4616862AF}" type="datetimeFigureOut">
               <a:rPr lang="en-US" smtClean="0"/>
-              <a:t>3/3/2016</a:t>
+              <a:t>3/5/2016</a:t>
             </a:fld>
             <a:endParaRPr lang="en-US"/>
           </a:p>
@@ -3530,7 +3543,7 @@
           </a:lstStyle>
           <a:p>
             <a:r>
-              <a:rPr lang="en-US" smtClean="0"/>
+              <a:rPr lang="en-US"/>
               <a:t>Click to edit Master title style</a:t>
             </a:r>
             <a:endParaRPr lang="en-US" dirty="0"/>
@@ -3559,35 +3572,35 @@
           <a:p>
             <a:pPr lvl="0"/>
             <a:r>
-              <a:rPr lang="en-US" smtClean="0"/>
+              <a:rPr lang="en-US"/>
               <a:t>Edit Master text styles</a:t>
             </a:r>
           </a:p>
           <a:p>
             <a:pPr lvl="1"/>
             <a:r>
-              <a:rPr lang="en-US" smtClean="0"/>
+              <a:rPr lang="en-US"/>
               <a:t>Second level</a:t>
             </a:r>
           </a:p>
           <a:p>
             <a:pPr lvl="2"/>
             <a:r>
-              <a:rPr lang="en-US" smtClean="0"/>
+              <a:rPr lang="en-US"/>
               <a:t>Third level</a:t>
             </a:r>
           </a:p>
           <a:p>
             <a:pPr lvl="3"/>
             <a:r>
-              <a:rPr lang="en-US" smtClean="0"/>
+              <a:rPr lang="en-US"/>
               <a:t>Fourth level</a:t>
             </a:r>
           </a:p>
           <a:p>
             <a:pPr lvl="4"/>
             <a:r>
-              <a:rPr lang="en-US" smtClean="0"/>
+              <a:rPr lang="en-US"/>
               <a:t>Fifth level</a:t>
             </a:r>
             <a:endParaRPr lang="en-US" dirty="0"/>
@@ -3611,7 +3624,7 @@
           <a:p>
             <a:fld id="{FF632088-7E42-4B13-8645-6CA4616862AF}" type="datetimeFigureOut">
               <a:rPr lang="en-US" smtClean="0"/>
-              <a:t>3/3/2016</a:t>
+              <a:t>3/5/2016</a:t>
             </a:fld>
             <a:endParaRPr lang="en-US"/>
           </a:p>
@@ -3753,7 +3766,7 @@
           </a:lstStyle>
           <a:p>
             <a:r>
-              <a:rPr lang="en-US" smtClean="0"/>
+              <a:rPr lang="en-US"/>
               <a:t>Click to edit Master title style</a:t>
             </a:r>
             <a:endParaRPr lang="en-US" dirty="0"/>
@@ -3876,7 +3889,7 @@
           <a:p>
             <a:pPr lvl="0"/>
             <a:r>
-              <a:rPr lang="en-US" smtClean="0"/>
+              <a:rPr lang="en-US"/>
               <a:t>Edit Master text styles</a:t>
             </a:r>
           </a:p>
@@ -3899,7 +3912,7 @@
           <a:p>
             <a:fld id="{FF632088-7E42-4B13-8645-6CA4616862AF}" type="datetimeFigureOut">
               <a:rPr lang="en-US" smtClean="0"/>
-              <a:t>3/3/2016</a:t>
+              <a:t>3/5/2016</a:t>
             </a:fld>
             <a:endParaRPr lang="en-US"/>
           </a:p>
@@ -3993,7 +4006,7 @@
           <a:lstStyle/>
           <a:p>
             <a:r>
-              <a:rPr lang="en-US" smtClean="0"/>
+              <a:rPr lang="en-US"/>
               <a:t>Click to edit Master title style</a:t>
             </a:r>
             <a:endParaRPr lang="en-US" dirty="0"/>
@@ -4022,35 +4035,35 @@
           <a:p>
             <a:pPr lvl="0"/>
             <a:r>
-              <a:rPr lang="en-US" smtClean="0"/>
+              <a:rPr lang="en-US"/>
               <a:t>Edit Master text styles</a:t>
             </a:r>
           </a:p>
           <a:p>
             <a:pPr lvl="1"/>
             <a:r>
-              <a:rPr lang="en-US" smtClean="0"/>
+              <a:rPr lang="en-US"/>
               <a:t>Second level</a:t>
             </a:r>
           </a:p>
           <a:p>
             <a:pPr lvl="2"/>
             <a:r>
-              <a:rPr lang="en-US" smtClean="0"/>
+              <a:rPr lang="en-US"/>
               <a:t>Third level</a:t>
             </a:r>
           </a:p>
           <a:p>
             <a:pPr lvl="3"/>
             <a:r>
-              <a:rPr lang="en-US" smtClean="0"/>
+              <a:rPr lang="en-US"/>
               <a:t>Fourth level</a:t>
             </a:r>
           </a:p>
           <a:p>
             <a:pPr lvl="4"/>
             <a:r>
-              <a:rPr lang="en-US" smtClean="0"/>
+              <a:rPr lang="en-US"/>
               <a:t>Fifth level</a:t>
             </a:r>
             <a:endParaRPr lang="en-US" dirty="0"/>
@@ -4079,35 +4092,35 @@
           <a:p>
             <a:pPr lvl="0"/>
             <a:r>
-              <a:rPr lang="en-US" smtClean="0"/>
+              <a:rPr lang="en-US"/>
               <a:t>Edit Master text styles</a:t>
             </a:r>
           </a:p>
           <a:p>
             <a:pPr lvl="1"/>
             <a:r>
-              <a:rPr lang="en-US" smtClean="0"/>
+              <a:rPr lang="en-US"/>
               <a:t>Second level</a:t>
             </a:r>
           </a:p>
           <a:p>
             <a:pPr lvl="2"/>
             <a:r>
-              <a:rPr lang="en-US" smtClean="0"/>
+              <a:rPr lang="en-US"/>
               <a:t>Third level</a:t>
             </a:r>
           </a:p>
           <a:p>
             <a:pPr lvl="3"/>
             <a:r>
-              <a:rPr lang="en-US" smtClean="0"/>
+              <a:rPr lang="en-US"/>
               <a:t>Fourth level</a:t>
             </a:r>
           </a:p>
           <a:p>
             <a:pPr lvl="4"/>
             <a:r>
-              <a:rPr lang="en-US" smtClean="0"/>
+              <a:rPr lang="en-US"/>
               <a:t>Fifth level</a:t>
             </a:r>
             <a:endParaRPr lang="en-US" dirty="0"/>
@@ -4131,7 +4144,7 @@
           <a:p>
             <a:fld id="{FF632088-7E42-4B13-8645-6CA4616862AF}" type="datetimeFigureOut">
               <a:rPr lang="en-US" smtClean="0"/>
-              <a:t>3/3/2016</a:t>
+              <a:t>3/5/2016</a:t>
             </a:fld>
             <a:endParaRPr lang="en-US"/>
           </a:p>
@@ -4191,7 +4204,7 @@
   </p:clrMapOvr>
   <p:extLst>
     <p:ext uri="{DCECCB84-F9BA-43D5-87BE-67443E8EF086}">
-      <p15:sldGuideLst xmlns:p15="http://schemas.microsoft.com/office/powerpoint/2012/main" xmlns=""/>
+      <p15:sldGuideLst xmlns:p15="http://schemas.microsoft.com/office/powerpoint/2012/main"/>
     </p:ext>
   </p:extLst>
 </p:sldLayout>
@@ -4278,7 +4291,7 @@
           <a:p>
             <a:pPr lvl="0"/>
             <a:r>
-              <a:rPr lang="en-US" smtClean="0"/>
+              <a:rPr lang="en-US"/>
               <a:t>Edit Master text styles</a:t>
             </a:r>
           </a:p>
@@ -4306,35 +4319,35 @@
           <a:p>
             <a:pPr lvl="0"/>
             <a:r>
-              <a:rPr lang="en-US" smtClean="0"/>
+              <a:rPr lang="en-US"/>
               <a:t>Edit Master text styles</a:t>
             </a:r>
           </a:p>
           <a:p>
             <a:pPr lvl="1"/>
             <a:r>
-              <a:rPr lang="en-US" smtClean="0"/>
+              <a:rPr lang="en-US"/>
               <a:t>Second level</a:t>
             </a:r>
           </a:p>
           <a:p>
             <a:pPr lvl="2"/>
             <a:r>
-              <a:rPr lang="en-US" smtClean="0"/>
+              <a:rPr lang="en-US"/>
               <a:t>Third level</a:t>
             </a:r>
           </a:p>
           <a:p>
             <a:pPr lvl="3"/>
             <a:r>
-              <a:rPr lang="en-US" smtClean="0"/>
+              <a:rPr lang="en-US"/>
               <a:t>Fourth level</a:t>
             </a:r>
           </a:p>
           <a:p>
             <a:pPr lvl="4"/>
             <a:r>
-              <a:rPr lang="en-US" smtClean="0"/>
+              <a:rPr lang="en-US"/>
               <a:t>Fifth level</a:t>
             </a:r>
             <a:endParaRPr lang="en-US" dirty="0"/>
@@ -4403,7 +4416,7 @@
           <a:p>
             <a:pPr lvl="0"/>
             <a:r>
-              <a:rPr lang="en-US" smtClean="0"/>
+              <a:rPr lang="en-US"/>
               <a:t>Edit Master text styles</a:t>
             </a:r>
           </a:p>
@@ -4431,38 +4444,37 @@
           <a:p>
             <a:pPr lvl="0"/>
             <a:r>
-              <a:rPr lang="en-US" smtClean="0"/>
+              <a:rPr lang="en-US"/>
               <a:t>Edit Master text styles</a:t>
             </a:r>
           </a:p>
           <a:p>
             <a:pPr lvl="1"/>
             <a:r>
-              <a:rPr lang="en-US" smtClean="0"/>
+              <a:rPr lang="en-US"/>
               <a:t>Second level</a:t>
             </a:r>
           </a:p>
           <a:p>
             <a:pPr lvl="2"/>
             <a:r>
-              <a:rPr lang="en-US" smtClean="0"/>
+              <a:rPr lang="en-US"/>
               <a:t>Third level</a:t>
             </a:r>
           </a:p>
           <a:p>
             <a:pPr lvl="3"/>
             <a:r>
-              <a:rPr lang="en-US" smtClean="0"/>
+              <a:rPr lang="en-US"/>
               <a:t>Fourth level</a:t>
             </a:r>
           </a:p>
           <a:p>
             <a:pPr lvl="4"/>
             <a:r>
-              <a:rPr lang="en-US" smtClean="0"/>
+              <a:rPr lang="en-US"/>
               <a:t>Fifth level</a:t>
             </a:r>
-            <a:endParaRPr lang="en-US"/>
           </a:p>
         </p:txBody>
       </p:sp>
@@ -4483,7 +4495,7 @@
           <a:p>
             <a:fld id="{FF632088-7E42-4B13-8645-6CA4616862AF}" type="datetimeFigureOut">
               <a:rPr lang="en-US" smtClean="0"/>
-              <a:t>3/3/2016</a:t>
+              <a:t>3/5/2016</a:t>
             </a:fld>
             <a:endParaRPr lang="en-US"/>
           </a:p>
@@ -4547,7 +4559,7 @@
           <a:lstStyle/>
           <a:p>
             <a:r>
-              <a:rPr lang="en-US" smtClean="0"/>
+              <a:rPr lang="en-US"/>
               <a:t>Click to edit Master title style</a:t>
             </a:r>
             <a:endParaRPr lang="en-US" dirty="0"/>
@@ -4566,7 +4578,7 @@
   </p:clrMapOvr>
   <p:extLst>
     <p:ext uri="{DCECCB84-F9BA-43D5-87BE-67443E8EF086}">
-      <p15:sldGuideLst xmlns:p15="http://schemas.microsoft.com/office/powerpoint/2012/main" xmlns=""/>
+      <p15:sldGuideLst xmlns:p15="http://schemas.microsoft.com/office/powerpoint/2012/main"/>
     </p:ext>
   </p:extLst>
 </p:sldLayout>
@@ -4606,7 +4618,7 @@
           <a:p>
             <a:fld id="{FF632088-7E42-4B13-8645-6CA4616862AF}" type="datetimeFigureOut">
               <a:rPr lang="en-US" smtClean="0"/>
-              <a:t>3/3/2016</a:t>
+              <a:t>3/5/2016</a:t>
             </a:fld>
             <a:endParaRPr lang="en-US"/>
           </a:p>
@@ -4670,10 +4682,9 @@
           <a:lstStyle/>
           <a:p>
             <a:r>
-              <a:rPr lang="en-US" smtClean="0"/>
+              <a:rPr lang="en-US"/>
               <a:t>Click to edit Master title style</a:t>
             </a:r>
-            <a:endParaRPr lang="en-US"/>
           </a:p>
         </p:txBody>
       </p:sp>
@@ -4724,7 +4735,7 @@
           <a:p>
             <a:fld id="{FF632088-7E42-4B13-8645-6CA4616862AF}" type="datetimeFigureOut">
               <a:rPr lang="en-US" smtClean="0"/>
-              <a:t>3/3/2016</a:t>
+              <a:t>3/5/2016</a:t>
             </a:fld>
             <a:endParaRPr lang="en-US"/>
           </a:p>
@@ -4829,7 +4840,7 @@
           </a:lstStyle>
           <a:p>
             <a:r>
-              <a:rPr lang="en-US" smtClean="0"/>
+              <a:rPr lang="en-US"/>
               <a:t>Click to edit Master title style</a:t>
             </a:r>
             <a:endParaRPr lang="en-US" dirty="0"/>
@@ -4886,35 +4897,35 @@
           <a:p>
             <a:pPr lvl="0"/>
             <a:r>
-              <a:rPr lang="en-US" smtClean="0"/>
+              <a:rPr lang="en-US"/>
               <a:t>Edit Master text styles</a:t>
             </a:r>
           </a:p>
           <a:p>
             <a:pPr lvl="1"/>
             <a:r>
-              <a:rPr lang="en-US" smtClean="0"/>
+              <a:rPr lang="en-US"/>
               <a:t>Second level</a:t>
             </a:r>
           </a:p>
           <a:p>
             <a:pPr lvl="2"/>
             <a:r>
-              <a:rPr lang="en-US" smtClean="0"/>
+              <a:rPr lang="en-US"/>
               <a:t>Third level</a:t>
             </a:r>
           </a:p>
           <a:p>
             <a:pPr lvl="3"/>
             <a:r>
-              <a:rPr lang="en-US" smtClean="0"/>
+              <a:rPr lang="en-US"/>
               <a:t>Fourth level</a:t>
             </a:r>
           </a:p>
           <a:p>
             <a:pPr lvl="4"/>
             <a:r>
-              <a:rPr lang="en-US" smtClean="0"/>
+              <a:rPr lang="en-US"/>
               <a:t>Fifth level</a:t>
             </a:r>
             <a:endParaRPr lang="en-US" dirty="0"/>
@@ -4985,7 +4996,7 @@
           <a:p>
             <a:pPr lvl="0"/>
             <a:r>
-              <a:rPr lang="en-US" smtClean="0"/>
+              <a:rPr lang="en-US"/>
               <a:t>Edit Master text styles</a:t>
             </a:r>
           </a:p>
@@ -5008,7 +5019,7 @@
           <a:p>
             <a:fld id="{FF632088-7E42-4B13-8645-6CA4616862AF}" type="datetimeFigureOut">
               <a:rPr lang="en-US" smtClean="0"/>
-              <a:t>3/3/2016</a:t>
+              <a:t>3/5/2016</a:t>
             </a:fld>
             <a:endParaRPr lang="en-US"/>
           </a:p>
@@ -5068,7 +5079,7 @@
   </p:clrMapOvr>
   <p:extLst>
     <p:ext uri="{DCECCB84-F9BA-43D5-87BE-67443E8EF086}">
-      <p15:sldGuideLst xmlns:p15="http://schemas.microsoft.com/office/powerpoint/2012/main" xmlns=""/>
+      <p15:sldGuideLst xmlns:p15="http://schemas.microsoft.com/office/powerpoint/2012/main"/>
     </p:ext>
   </p:extLst>
 </p:sldLayout>
@@ -5118,7 +5129,7 @@
           </a:lstStyle>
           <a:p>
             <a:r>
-              <a:rPr lang="en-US" smtClean="0"/>
+              <a:rPr lang="en-US"/>
               <a:t>Click to edit Master title style</a:t>
             </a:r>
             <a:endParaRPr lang="en-US" dirty="0"/>
@@ -5183,7 +5194,7 @@
           </a:lstStyle>
           <a:p>
             <a:r>
-              <a:rPr lang="en-US" smtClean="0"/>
+              <a:rPr lang="en-US"/>
               <a:t>Click icon to add picture</a:t>
             </a:r>
             <a:endParaRPr lang="en-US" dirty="0"/>
@@ -5254,7 +5265,7 @@
           <a:p>
             <a:pPr lvl="0"/>
             <a:r>
-              <a:rPr lang="en-US" smtClean="0"/>
+              <a:rPr lang="en-US"/>
               <a:t>Edit Master text styles</a:t>
             </a:r>
           </a:p>
@@ -5277,7 +5288,7 @@
           <a:p>
             <a:fld id="{FF632088-7E42-4B13-8645-6CA4616862AF}" type="datetimeFigureOut">
               <a:rPr lang="en-US" smtClean="0"/>
-              <a:t>3/3/2016</a:t>
+              <a:t>3/5/2016</a:t>
             </a:fld>
             <a:endParaRPr lang="en-US"/>
           </a:p>
@@ -5386,7 +5397,7 @@
           <a:lstStyle/>
           <a:p>
             <a:r>
-              <a:rPr lang="en-US" smtClean="0"/>
+              <a:rPr lang="en-US"/>
               <a:t>Click to edit Master title style</a:t>
             </a:r>
             <a:endParaRPr lang="en-US" dirty="0"/>
@@ -5420,35 +5431,35 @@
           <a:p>
             <a:pPr lvl="0"/>
             <a:r>
-              <a:rPr lang="en-US" smtClean="0"/>
+              <a:rPr lang="en-US"/>
               <a:t>Edit Master text styles</a:t>
             </a:r>
           </a:p>
           <a:p>
             <a:pPr lvl="1"/>
             <a:r>
-              <a:rPr lang="en-US" smtClean="0"/>
+              <a:rPr lang="en-US"/>
               <a:t>Second level</a:t>
             </a:r>
           </a:p>
           <a:p>
             <a:pPr lvl="2"/>
             <a:r>
-              <a:rPr lang="en-US" smtClean="0"/>
+              <a:rPr lang="en-US"/>
               <a:t>Third level</a:t>
             </a:r>
           </a:p>
           <a:p>
             <a:pPr lvl="3"/>
             <a:r>
-              <a:rPr lang="en-US" smtClean="0"/>
+              <a:rPr lang="en-US"/>
               <a:t>Fourth level</a:t>
             </a:r>
           </a:p>
           <a:p>
             <a:pPr lvl="4"/>
             <a:r>
-              <a:rPr lang="en-US" smtClean="0"/>
+              <a:rPr lang="en-US"/>
               <a:t>Fifth level</a:t>
             </a:r>
             <a:endParaRPr lang="en-US" dirty="0"/>
@@ -5491,7 +5502,7 @@
           <a:p>
             <a:fld id="{FF632088-7E42-4B13-8645-6CA4616862AF}" type="datetimeFigureOut">
               <a:rPr lang="en-US" smtClean="0"/>
-              <a:t>3/3/2016</a:t>
+              <a:t>3/5/2016</a:t>
             </a:fld>
             <a:endParaRPr lang="en-US"/>
           </a:p>
@@ -5867,7 +5878,7 @@
   </p:txStyles>
   <p:extLst>
     <p:ext uri="{27BBF7A9-308A-43DC-89C8-2F10F3537804}">
-      <p15:sldGuideLst xmlns:p15="http://schemas.microsoft.com/office/powerpoint/2012/main" xmlns=""/>
+      <p15:sldGuideLst xmlns:p15="http://schemas.microsoft.com/office/powerpoint/2012/main"/>
     </p:ext>
   </p:extLst>
 </p:sldMaster>
@@ -5993,7 +6004,7 @@
           <a:lstStyle/>
           <a:p>
             <a:r>
-              <a:rPr lang="en-US" smtClean="0"/>
+              <a:rPr lang="en-US"/>
               <a:t>Click to edit Master title style</a:t>
             </a:r>
             <a:endParaRPr lang="en-US" dirty="0"/>
@@ -6096,7 +6107,7 @@
           <a:p>
             <a:fld id="{FF632088-7E42-4B13-8645-6CA4616862AF}" type="datetimeFigureOut">
               <a:rPr lang="en-US" smtClean="0"/>
-              <a:t>3/3/2016</a:t>
+              <a:t>3/5/2016</a:t>
             </a:fld>
             <a:endParaRPr lang="en-US"/>
           </a:p>
@@ -6564,7 +6575,7 @@
   </p:txStyles>
   <p:extLst>
     <p:ext uri="{27BBF7A9-308A-43DC-89C8-2F10F3537804}">
-      <p15:sldGuideLst xmlns:p15="http://schemas.microsoft.com/office/powerpoint/2012/main" xmlns=""/>
+      <p15:sldGuideLst xmlns:p15="http://schemas.microsoft.com/office/powerpoint/2012/main"/>
     </p:ext>
   </p:extLst>
 </p:sldMaster>
@@ -6603,10 +6614,9 @@
           <a:lstStyle/>
           <a:p>
             <a:r>
-              <a:rPr lang="en-US" dirty="0" smtClean="0"/>
+              <a:rPr lang="en-US" dirty="0"/>
               <a:t>Re-Adjudicating Claims</a:t>
             </a:r>
-            <a:endParaRPr lang="en-US" dirty="0"/>
           </a:p>
         </p:txBody>
       </p:sp>
@@ -6626,13 +6636,45 @@
           <a:lstStyle/>
           <a:p>
             <a:r>
-              <a:rPr lang="en-US" smtClean="0"/>
+              <a:rPr lang="en-US"/>
               <a:t>Spyridon Ganas</a:t>
             </a:r>
-            <a:endParaRPr lang="en-US"/>
-          </a:p>
-        </p:txBody>
-      </p:sp>
+          </a:p>
+        </p:txBody>
+      </p:sp>
+      <p:pic>
+        <p:nvPicPr>
+          <p:cNvPr id="5" name="Audio 4">
+            <a:hlinkClick r:id="" action="ppaction://media"/>
+          </p:cNvPr>
+          <p:cNvPicPr>
+            <a:picLocks noChangeAspect="1"/>
+          </p:cNvPicPr>
+          <p:nvPr>
+            <a:audioFile r:link="rId2"/>
+            <p:extLst>
+              <p:ext uri="{DAA4B4D4-6D71-4841-9C94-3DE7FCFB9230}">
+                <p14:media xmlns:p14="http://schemas.microsoft.com/office/powerpoint/2010/main" r:embed="rId1"/>
+              </p:ext>
+            </p:extLst>
+          </p:nvPr>
+        </p:nvPicPr>
+        <p:blipFill>
+          <a:blip r:embed="rId4"/>
+          <a:stretch>
+            <a:fillRect/>
+          </a:stretch>
+        </p:blipFill>
+        <p:spPr>
+          <a:xfrm>
+            <a:off x="12616249" y="5984790"/>
+            <a:ext cx="609600" cy="609600"/>
+          </a:xfrm>
+          <a:prstGeom prst="rect">
+            <a:avLst/>
+          </a:prstGeom>
+        </p:spPr>
+      </p:pic>
     </p:spTree>
     <p:extLst>
       <p:ext uri="{BB962C8B-B14F-4D97-AF65-F5344CB8AC3E}">
@@ -6643,6 +6685,101 @@
   <p:clrMapOvr>
     <a:masterClrMapping/>
   </p:clrMapOvr>
+  <mc:AlternateContent xmlns:mc="http://schemas.openxmlformats.org/markup-compatibility/2006">
+    <mc:Choice xmlns:p14="http://schemas.microsoft.com/office/powerpoint/2010/main" Requires="p14">
+      <p:transition spd="slow" p14:dur="2000" advTm="10375"/>
+    </mc:Choice>
+    <mc:Fallback>
+      <p:transition spd="slow" advTm="10375"/>
+    </mc:Fallback>
+  </mc:AlternateContent>
+  <p:timing>
+    <p:tnLst>
+      <p:par>
+        <p:cTn id="1" dur="indefinite" restart="never" nodeType="tmRoot">
+          <p:childTnLst>
+            <p:seq concurrent="1" nextAc="seek">
+              <p:cTn id="2" dur="indefinite" nodeType="mainSeq">
+                <p:childTnLst>
+                  <p:par>
+                    <p:cTn id="3" fill="hold">
+                      <p:stCondLst>
+                        <p:cond delay="indefinite"/>
+                        <p:cond evt="onBegin" delay="0">
+                          <p:tn val="2"/>
+                        </p:cond>
+                      </p:stCondLst>
+                      <p:childTnLst>
+                        <p:par>
+                          <p:cTn id="4" fill="hold">
+                            <p:stCondLst>
+                              <p:cond delay="0"/>
+                            </p:stCondLst>
+                            <p:childTnLst>
+                              <p:par>
+                                <p:cTn id="5" presetID="1" presetClass="mediacall" presetSubtype="0" fill="hold" nodeType="afterEffect">
+                                  <p:stCondLst>
+                                    <p:cond delay="0"/>
+                                  </p:stCondLst>
+                                  <p:childTnLst>
+                                    <p:cmd type="call" cmd="playFrom(0.0)">
+                                      <p:cBhvr>
+                                        <p:cTn id="6" dur="1" fill="hold"/>
+                                        <p:tgtEl>
+                                          <p:spTgt spid="5"/>
+                                        </p:tgtEl>
+                                      </p:cBhvr>
+                                    </p:cmd>
+                                  </p:childTnLst>
+                                </p:cTn>
+                              </p:par>
+                            </p:childTnLst>
+                          </p:cTn>
+                        </p:par>
+                      </p:childTnLst>
+                    </p:cTn>
+                  </p:par>
+                </p:childTnLst>
+              </p:cTn>
+              <p:prevCondLst>
+                <p:cond evt="onPrev" delay="0">
+                  <p:tgtEl>
+                    <p:sldTgt/>
+                  </p:tgtEl>
+                </p:cond>
+              </p:prevCondLst>
+              <p:nextCondLst>
+                <p:cond evt="onNext" delay="0">
+                  <p:tgtEl>
+                    <p:sldTgt/>
+                  </p:tgtEl>
+                </p:cond>
+              </p:nextCondLst>
+            </p:seq>
+            <p:audio isNarration="1">
+              <p:cMediaNode vol="80000" showWhenStopped="0">
+                <p:cTn id="7" fill="hold" display="0">
+                  <p:stCondLst>
+                    <p:cond delay="indefinite"/>
+                  </p:stCondLst>
+                  <p:endCondLst>
+                    <p:cond evt="onStopAudio" delay="0">
+                      <p:tgtEl>
+                        <p:sldTgt/>
+                      </p:tgtEl>
+                    </p:cond>
+                  </p:endCondLst>
+                </p:cTn>
+                <p:tgtEl>
+                  <p:spTgt spid="5"/>
+                </p:tgtEl>
+              </p:cMediaNode>
+            </p:audio>
+          </p:childTnLst>
+        </p:cTn>
+      </p:par>
+    </p:tnLst>
+  </p:timing>
 </p:sld>
 </file>
 
@@ -6679,10 +6816,9 @@
           <a:lstStyle/>
           <a:p>
             <a:r>
-              <a:rPr lang="en-US" dirty="0" smtClean="0"/>
+              <a:rPr lang="en-US" dirty="0"/>
               <a:t>Re-adjudication and Claims Versioning</a:t>
             </a:r>
-            <a:endParaRPr lang="en-US" dirty="0"/>
           </a:p>
         </p:txBody>
       </p:sp>
@@ -6707,31 +6843,63 @@
           <a:lstStyle/>
           <a:p>
             <a:r>
-              <a:rPr lang="en-US" dirty="0" smtClean="0"/>
+              <a:rPr lang="en-US" dirty="0"/>
               <a:t>Insurance organizations frequently review claims to verify that the correct payment has been made.</a:t>
             </a:r>
           </a:p>
           <a:p>
             <a:r>
-              <a:rPr lang="en-US" dirty="0" smtClean="0"/>
+              <a:rPr lang="en-US" dirty="0"/>
               <a:t>When an incorrect payment is found, the claim is “re-adjudicated” to calculate the amount that should have been paid.  The incorrect payment is “backed-out” and the correct payment is recorded.</a:t>
             </a:r>
           </a:p>
           <a:p>
             <a:r>
-              <a:rPr lang="en-US" dirty="0" smtClean="0"/>
+              <a:rPr lang="en-US" dirty="0"/>
               <a:t>This can create multiple versions of a claim in the APCD.</a:t>
             </a:r>
           </a:p>
           <a:p>
             <a:r>
-              <a:rPr lang="en-US" dirty="0" smtClean="0"/>
+              <a:rPr lang="en-US" dirty="0"/>
               <a:t>A “Highest Version Indicator” field has been created to identify the most recent version of the claim. </a:t>
             </a:r>
-            <a:endParaRPr lang="en-US" dirty="0"/>
-          </a:p>
-        </p:txBody>
-      </p:sp>
+          </a:p>
+        </p:txBody>
+      </p:sp>
+      <p:pic>
+        <p:nvPicPr>
+          <p:cNvPr id="4" name="Audio 3">
+            <a:hlinkClick r:id="" action="ppaction://media"/>
+          </p:cNvPr>
+          <p:cNvPicPr>
+            <a:picLocks noChangeAspect="1"/>
+          </p:cNvPicPr>
+          <p:nvPr>
+            <a:audioFile r:link="rId2"/>
+            <p:extLst>
+              <p:ext uri="{DAA4B4D4-6D71-4841-9C94-3DE7FCFB9230}">
+                <p14:media xmlns:p14="http://schemas.microsoft.com/office/powerpoint/2010/main" r:embed="rId1"/>
+              </p:ext>
+            </p:extLst>
+          </p:nvPr>
+        </p:nvPicPr>
+        <p:blipFill>
+          <a:blip r:embed="rId4"/>
+          <a:stretch>
+            <a:fillRect/>
+          </a:stretch>
+        </p:blipFill>
+        <p:spPr>
+          <a:xfrm>
+            <a:off x="12739816" y="6133070"/>
+            <a:ext cx="609600" cy="609600"/>
+          </a:xfrm>
+          <a:prstGeom prst="rect">
+            <a:avLst/>
+          </a:prstGeom>
+        </p:spPr>
+      </p:pic>
     </p:spTree>
     <p:extLst>
       <p:ext uri="{BB962C8B-B14F-4D97-AF65-F5344CB8AC3E}">
@@ -6742,6 +6910,101 @@
   <p:clrMapOvr>
     <a:masterClrMapping/>
   </p:clrMapOvr>
+  <mc:AlternateContent xmlns:mc="http://schemas.openxmlformats.org/markup-compatibility/2006">
+    <mc:Choice xmlns:p14="http://schemas.microsoft.com/office/powerpoint/2010/main" Requires="p14">
+      <p:transition spd="slow" p14:dur="2000" advTm="36115"/>
+    </mc:Choice>
+    <mc:Fallback>
+      <p:transition spd="slow" advTm="36115"/>
+    </mc:Fallback>
+  </mc:AlternateContent>
+  <p:timing>
+    <p:tnLst>
+      <p:par>
+        <p:cTn id="1" dur="indefinite" restart="never" nodeType="tmRoot">
+          <p:childTnLst>
+            <p:seq concurrent="1" nextAc="seek">
+              <p:cTn id="2" dur="indefinite" nodeType="mainSeq">
+                <p:childTnLst>
+                  <p:par>
+                    <p:cTn id="3" fill="hold">
+                      <p:stCondLst>
+                        <p:cond delay="indefinite"/>
+                        <p:cond evt="onBegin" delay="0">
+                          <p:tn val="2"/>
+                        </p:cond>
+                      </p:stCondLst>
+                      <p:childTnLst>
+                        <p:par>
+                          <p:cTn id="4" fill="hold">
+                            <p:stCondLst>
+                              <p:cond delay="0"/>
+                            </p:stCondLst>
+                            <p:childTnLst>
+                              <p:par>
+                                <p:cTn id="5" presetID="1" presetClass="mediacall" presetSubtype="0" fill="hold" nodeType="afterEffect">
+                                  <p:stCondLst>
+                                    <p:cond delay="0"/>
+                                  </p:stCondLst>
+                                  <p:childTnLst>
+                                    <p:cmd type="call" cmd="playFrom(0.0)">
+                                      <p:cBhvr>
+                                        <p:cTn id="6" dur="1" fill="hold"/>
+                                        <p:tgtEl>
+                                          <p:spTgt spid="4"/>
+                                        </p:tgtEl>
+                                      </p:cBhvr>
+                                    </p:cmd>
+                                  </p:childTnLst>
+                                </p:cTn>
+                              </p:par>
+                            </p:childTnLst>
+                          </p:cTn>
+                        </p:par>
+                      </p:childTnLst>
+                    </p:cTn>
+                  </p:par>
+                </p:childTnLst>
+              </p:cTn>
+              <p:prevCondLst>
+                <p:cond evt="onPrev" delay="0">
+                  <p:tgtEl>
+                    <p:sldTgt/>
+                  </p:tgtEl>
+                </p:cond>
+              </p:prevCondLst>
+              <p:nextCondLst>
+                <p:cond evt="onNext" delay="0">
+                  <p:tgtEl>
+                    <p:sldTgt/>
+                  </p:tgtEl>
+                </p:cond>
+              </p:nextCondLst>
+            </p:seq>
+            <p:audio isNarration="1">
+              <p:cMediaNode vol="80000" showWhenStopped="0">
+                <p:cTn id="7" fill="hold" display="0">
+                  <p:stCondLst>
+                    <p:cond delay="indefinite"/>
+                  </p:stCondLst>
+                  <p:endCondLst>
+                    <p:cond evt="onStopAudio" delay="0">
+                      <p:tgtEl>
+                        <p:sldTgt/>
+                      </p:tgtEl>
+                    </p:cond>
+                  </p:endCondLst>
+                </p:cTn>
+                <p:tgtEl>
+                  <p:spTgt spid="4"/>
+                </p:tgtEl>
+              </p:cMediaNode>
+            </p:audio>
+          </p:childTnLst>
+        </p:cTn>
+      </p:par>
+    </p:tnLst>
+  </p:timing>
 </p:sld>
 </file>
 
@@ -6778,7 +7041,7 @@
           <a:lstStyle/>
           <a:p>
             <a:r>
-              <a:rPr lang="en-US" smtClean="0"/>
+              <a:rPr lang="en-US"/>
               <a:t>References</a:t>
             </a:r>
             <a:endParaRPr lang="en-US" dirty="0"/>
@@ -6804,15 +7067,9 @@
               <a:rPr lang="en-US" dirty="0">
                 <a:hlinkClick r:id="rId2"/>
               </a:rPr>
-              <a:t>http://</a:t>
-            </a:r>
-            <a:r>
-              <a:rPr lang="en-US" dirty="0" smtClean="0">
-                <a:hlinkClick r:id="rId2"/>
-              </a:rPr>
-              <a:t>www.chiamass.gov/assets/docs/p/apcd/CHIADOCS-GOVT-APCD-FINAL-10-27.pdf</a:t>
-            </a:r>
-            <a:endParaRPr lang="en-US" dirty="0" smtClean="0"/>
+              <a:t>http://www.chiamass.gov/assets/docs/p/apcd/CHIADOCS-GOVT-APCD-FINAL-10-27.pdf</a:t>
+            </a:r>
+            <a:endParaRPr lang="en-US" dirty="0"/>
           </a:p>
           <a:p>
             <a:endParaRPr lang="en-US" dirty="0"/>
@@ -7332,7 +7589,7 @@
   <a:extraClrSchemeLst/>
   <a:extLst>
     <a:ext uri="{05A4C25C-085E-4340-85A3-A5531E510DB2}">
-      <thm15:themeFamily xmlns:thm15="http://schemas.microsoft.com/office/thememl/2012/main" xmlns="" name="Gallery" id="{BBFCD31E-59A1-489D-B089-A3EAD7CAE12E}" vid="{AC464412-510E-4F2B-8947-A0DDBD028997}"/>
+      <thm15:themeFamily xmlns:thm15="http://schemas.microsoft.com/office/thememl/2012/main" name="Gallery" id="{BBFCD31E-59A1-489D-B089-A3EAD7CAE12E}" vid="{AC464412-510E-4F2B-8947-A0DDBD028997}"/>
     </a:ext>
   </a:extLst>
 </a:theme>

</xml_diff>